<commit_message>
docs: imagem de fundo do dashboard
</commit_message>
<xml_diff>
--- a/Power BI/Fundo_hashtagtreinamentos.pptx
+++ b/Power BI/Fundo_hashtagtreinamentos.pptx
@@ -5,10 +5,11 @@
     <p:sldMasterId id="2147483648" r:id="rId1"/>
   </p:sldMasterIdLst>
   <p:notesMasterIdLst>
-    <p:notesMasterId r:id="rId3"/>
+    <p:notesMasterId r:id="rId4"/>
   </p:notesMasterIdLst>
   <p:sldIdLst>
     <p:sldId id="256" r:id="rId2"/>
+    <p:sldId id="257" r:id="rId3"/>
   </p:sldIdLst>
   <p:sldSz cx="12192000" cy="6858000"/>
   <p:notesSz cx="6858000" cy="9144000"/>
@@ -208,7 +209,7 @@
           <a:p>
             <a:fld id="{89898387-25CB-48BF-831D-C9CB1B925B56}" type="datetimeFigureOut">
               <a:rPr lang="pt-BR" smtClean="0"/>
-              <a:t>21/04/2022</a:t>
+              <a:t>23/04/2022</a:t>
             </a:fld>
             <a:endParaRPr lang="pt-BR"/>
           </a:p>
@@ -570,6 +571,101 @@
 </p:notes>
 </file>
 
+<file path=ppt/notesSlides/notesSlide2.xml><?xml version="1.0" encoding="utf-8"?>
+<p:notes xmlns:a="http://schemas.openxmlformats.org/drawingml/2006/main" xmlns:r="http://schemas.openxmlformats.org/officeDocument/2006/relationships" xmlns:p="http://schemas.openxmlformats.org/presentationml/2006/main">
+  <p:cSld>
+    <p:spTree>
+      <p:nvGrpSpPr>
+        <p:cNvPr id="1" name=""/>
+        <p:cNvGrpSpPr/>
+        <p:nvPr/>
+      </p:nvGrpSpPr>
+      <p:grpSpPr>
+        <a:xfrm>
+          <a:off x="0" y="0"/>
+          <a:ext cx="0" cy="0"/>
+          <a:chOff x="0" y="0"/>
+          <a:chExt cx="0" cy="0"/>
+        </a:xfrm>
+      </p:grpSpPr>
+      <p:sp>
+        <p:nvSpPr>
+          <p:cNvPr id="2" name="Espaço Reservado para Imagem de Slide 1"/>
+          <p:cNvSpPr>
+            <a:spLocks noGrp="1" noRot="1" noChangeAspect="1"/>
+          </p:cNvSpPr>
+          <p:nvPr>
+            <p:ph type="sldImg"/>
+          </p:nvPr>
+        </p:nvSpPr>
+        <p:spPr/>
+      </p:sp>
+      <p:sp>
+        <p:nvSpPr>
+          <p:cNvPr id="3" name="Espaço Reservado para Anotações 2"/>
+          <p:cNvSpPr>
+            <a:spLocks noGrp="1"/>
+          </p:cNvSpPr>
+          <p:nvPr>
+            <p:ph type="body" idx="1"/>
+          </p:nvPr>
+        </p:nvSpPr>
+        <p:spPr/>
+        <p:txBody>
+          <a:bodyPr/>
+          <a:lstStyle/>
+          <a:p>
+            <a:r>
+              <a:rPr lang="pt-BR" dirty="0"/>
+              <a:t>(https://www.youtube.com/</a:t>
+            </a:r>
+            <a:r>
+              <a:rPr lang="pt-BR" dirty="0" err="1"/>
+              <a:t>watch?v</a:t>
+            </a:r>
+            <a:r>
+              <a:rPr lang="pt-BR" dirty="0"/>
+              <a:t>=UpfgRse3RLo) parei aos 08:05</a:t>
+            </a:r>
+          </a:p>
+        </p:txBody>
+      </p:sp>
+      <p:sp>
+        <p:nvSpPr>
+          <p:cNvPr id="4" name="Espaço Reservado para Número de Slide 3"/>
+          <p:cNvSpPr>
+            <a:spLocks noGrp="1"/>
+          </p:cNvSpPr>
+          <p:nvPr>
+            <p:ph type="sldNum" sz="quarter" idx="5"/>
+          </p:nvPr>
+        </p:nvSpPr>
+        <p:spPr/>
+        <p:txBody>
+          <a:bodyPr/>
+          <a:lstStyle/>
+          <a:p>
+            <a:fld id="{55BE7331-AACE-42E1-ACC6-3DBB55268309}" type="slidenum">
+              <a:rPr lang="pt-BR" smtClean="0"/>
+              <a:t>2</a:t>
+            </a:fld>
+            <a:endParaRPr lang="pt-BR"/>
+          </a:p>
+        </p:txBody>
+      </p:sp>
+    </p:spTree>
+    <p:extLst>
+      <p:ext uri="{BB962C8B-B14F-4D97-AF65-F5344CB8AC3E}">
+        <p14:creationId xmlns:p14="http://schemas.microsoft.com/office/powerpoint/2010/main" val="470347632"/>
+      </p:ext>
+    </p:extLst>
+  </p:cSld>
+  <p:clrMapOvr>
+    <a:masterClrMapping/>
+  </p:clrMapOvr>
+</p:notes>
+</file>
+
 <file path=ppt/slideLayouts/slideLayout1.xml><?xml version="1.0" encoding="utf-8"?>
 <p:sldLayout xmlns:a="http://schemas.openxmlformats.org/drawingml/2006/main" xmlns:r="http://schemas.openxmlformats.org/officeDocument/2006/relationships" xmlns:p="http://schemas.openxmlformats.org/presentationml/2006/main" type="title" preserve="1">
   <p:cSld name="Slide de Título">
@@ -717,7 +813,7 @@
           <a:p>
             <a:fld id="{C548DC58-09D5-4E30-B733-E965AEE8D055}" type="datetimeFigureOut">
               <a:rPr lang="pt-BR" smtClean="0"/>
-              <a:t>21/04/2022</a:t>
+              <a:t>23/04/2022</a:t>
             </a:fld>
             <a:endParaRPr lang="pt-BR"/>
           </a:p>
@@ -915,7 +1011,7 @@
           <a:p>
             <a:fld id="{C548DC58-09D5-4E30-B733-E965AEE8D055}" type="datetimeFigureOut">
               <a:rPr lang="pt-BR" smtClean="0"/>
-              <a:t>21/04/2022</a:t>
+              <a:t>23/04/2022</a:t>
             </a:fld>
             <a:endParaRPr lang="pt-BR"/>
           </a:p>
@@ -1123,7 +1219,7 @@
           <a:p>
             <a:fld id="{C548DC58-09D5-4E30-B733-E965AEE8D055}" type="datetimeFigureOut">
               <a:rPr lang="pt-BR" smtClean="0"/>
-              <a:t>21/04/2022</a:t>
+              <a:t>23/04/2022</a:t>
             </a:fld>
             <a:endParaRPr lang="pt-BR"/>
           </a:p>
@@ -1321,7 +1417,7 @@
           <a:p>
             <a:fld id="{C548DC58-09D5-4E30-B733-E965AEE8D055}" type="datetimeFigureOut">
               <a:rPr lang="pt-BR" smtClean="0"/>
-              <a:t>21/04/2022</a:t>
+              <a:t>23/04/2022</a:t>
             </a:fld>
             <a:endParaRPr lang="pt-BR"/>
           </a:p>
@@ -1596,7 +1692,7 @@
           <a:p>
             <a:fld id="{C548DC58-09D5-4E30-B733-E965AEE8D055}" type="datetimeFigureOut">
               <a:rPr lang="pt-BR" smtClean="0"/>
-              <a:t>21/04/2022</a:t>
+              <a:t>23/04/2022</a:t>
             </a:fld>
             <a:endParaRPr lang="pt-BR"/>
           </a:p>
@@ -1861,7 +1957,7 @@
           <a:p>
             <a:fld id="{C548DC58-09D5-4E30-B733-E965AEE8D055}" type="datetimeFigureOut">
               <a:rPr lang="pt-BR" smtClean="0"/>
-              <a:t>21/04/2022</a:t>
+              <a:t>23/04/2022</a:t>
             </a:fld>
             <a:endParaRPr lang="pt-BR"/>
           </a:p>
@@ -2273,7 +2369,7 @@
           <a:p>
             <a:fld id="{C548DC58-09D5-4E30-B733-E965AEE8D055}" type="datetimeFigureOut">
               <a:rPr lang="pt-BR" smtClean="0"/>
-              <a:t>21/04/2022</a:t>
+              <a:t>23/04/2022</a:t>
             </a:fld>
             <a:endParaRPr lang="pt-BR"/>
           </a:p>
@@ -2414,7 +2510,7 @@
           <a:p>
             <a:fld id="{C548DC58-09D5-4E30-B733-E965AEE8D055}" type="datetimeFigureOut">
               <a:rPr lang="pt-BR" smtClean="0"/>
-              <a:t>21/04/2022</a:t>
+              <a:t>23/04/2022</a:t>
             </a:fld>
             <a:endParaRPr lang="pt-BR"/>
           </a:p>
@@ -2527,7 +2623,7 @@
           <a:p>
             <a:fld id="{C548DC58-09D5-4E30-B733-E965AEE8D055}" type="datetimeFigureOut">
               <a:rPr lang="pt-BR" smtClean="0"/>
-              <a:t>21/04/2022</a:t>
+              <a:t>23/04/2022</a:t>
             </a:fld>
             <a:endParaRPr lang="pt-BR"/>
           </a:p>
@@ -2838,7 +2934,7 @@
           <a:p>
             <a:fld id="{C548DC58-09D5-4E30-B733-E965AEE8D055}" type="datetimeFigureOut">
               <a:rPr lang="pt-BR" smtClean="0"/>
-              <a:t>21/04/2022</a:t>
+              <a:t>23/04/2022</a:t>
             </a:fld>
             <a:endParaRPr lang="pt-BR"/>
           </a:p>
@@ -3126,7 +3222,7 @@
           <a:p>
             <a:fld id="{C548DC58-09D5-4E30-B733-E965AEE8D055}" type="datetimeFigureOut">
               <a:rPr lang="pt-BR" smtClean="0"/>
-              <a:t>21/04/2022</a:t>
+              <a:t>23/04/2022</a:t>
             </a:fld>
             <a:endParaRPr lang="pt-BR"/>
           </a:p>
@@ -3367,7 +3463,7 @@
           <a:p>
             <a:fld id="{C548DC58-09D5-4E30-B733-E965AEE8D055}" type="datetimeFigureOut">
               <a:rPr lang="pt-BR" smtClean="0"/>
-              <a:t>21/04/2022</a:t>
+              <a:t>23/04/2022</a:t>
             </a:fld>
             <a:endParaRPr lang="pt-BR"/>
           </a:p>
@@ -4323,6 +4419,512 @@
     <p:extLst>
       <p:ext uri="{BB962C8B-B14F-4D97-AF65-F5344CB8AC3E}">
         <p14:creationId xmlns:p14="http://schemas.microsoft.com/office/powerpoint/2010/main" val="1608733873"/>
+      </p:ext>
+    </p:extLst>
+  </p:cSld>
+  <p:clrMapOvr>
+    <a:masterClrMapping/>
+  </p:clrMapOvr>
+</p:sld>
+</file>
+
+<file path=ppt/slides/slide2.xml><?xml version="1.0" encoding="utf-8"?>
+<p:sld xmlns:a="http://schemas.openxmlformats.org/drawingml/2006/main" xmlns:r="http://schemas.openxmlformats.org/officeDocument/2006/relationships" xmlns:p="http://schemas.openxmlformats.org/presentationml/2006/main">
+  <p:cSld>
+    <p:bg>
+      <p:bgPr>
+        <a:solidFill>
+          <a:schemeClr val="accent5">
+            <a:lumMod val="20000"/>
+            <a:lumOff val="80000"/>
+          </a:schemeClr>
+        </a:solidFill>
+        <a:effectLst/>
+      </p:bgPr>
+    </p:bg>
+    <p:spTree>
+      <p:nvGrpSpPr>
+        <p:cNvPr id="1" name=""/>
+        <p:cNvGrpSpPr/>
+        <p:nvPr/>
+      </p:nvGrpSpPr>
+      <p:grpSpPr>
+        <a:xfrm>
+          <a:off x="0" y="0"/>
+          <a:ext cx="0" cy="0"/>
+          <a:chOff x="0" y="0"/>
+          <a:chExt cx="0" cy="0"/>
+        </a:xfrm>
+      </p:grpSpPr>
+      <p:sp>
+        <p:nvSpPr>
+          <p:cNvPr id="5" name="Retângulo 4">
+            <a:extLst>
+              <a:ext uri="{FF2B5EF4-FFF2-40B4-BE49-F238E27FC236}">
+                <a16:creationId xmlns:a16="http://schemas.microsoft.com/office/drawing/2014/main" id="{2E5106B7-0EEC-48EE-B59E-743D0420DB5B}"/>
+              </a:ext>
+            </a:extLst>
+          </p:cNvPr>
+          <p:cNvSpPr/>
+          <p:nvPr/>
+        </p:nvSpPr>
+        <p:spPr>
+          <a:xfrm rot="5400000">
+            <a:off x="5712542" y="-5712542"/>
+            <a:ext cx="766916" cy="12192000"/>
+          </a:xfrm>
+          <a:prstGeom prst="rect">
+            <a:avLst/>
+          </a:prstGeom>
+          <a:solidFill>
+            <a:schemeClr val="bg1"/>
+          </a:solidFill>
+          <a:ln>
+            <a:noFill/>
+          </a:ln>
+          <a:effectLst>
+            <a:outerShdw blurRad="50800" dist="12700" algn="l" rotWithShape="0">
+              <a:prstClr val="black">
+                <a:alpha val="20000"/>
+              </a:prstClr>
+            </a:outerShdw>
+          </a:effectLst>
+        </p:spPr>
+        <p:style>
+          <a:lnRef idx="2">
+            <a:schemeClr val="accent1">
+              <a:shade val="50000"/>
+            </a:schemeClr>
+          </a:lnRef>
+          <a:fillRef idx="1">
+            <a:schemeClr val="accent1"/>
+          </a:fillRef>
+          <a:effectRef idx="0">
+            <a:schemeClr val="accent1"/>
+          </a:effectRef>
+          <a:fontRef idx="minor">
+            <a:schemeClr val="lt1"/>
+          </a:fontRef>
+        </p:style>
+        <p:txBody>
+          <a:bodyPr rtlCol="0" anchor="ctr"/>
+          <a:lstStyle/>
+          <a:p>
+            <a:pPr algn="ctr"/>
+            <a:endParaRPr lang="pt-BR"/>
+          </a:p>
+        </p:txBody>
+      </p:sp>
+      <p:sp>
+        <p:nvSpPr>
+          <p:cNvPr id="6" name="Retângulo 5">
+            <a:extLst>
+              <a:ext uri="{FF2B5EF4-FFF2-40B4-BE49-F238E27FC236}">
+                <a16:creationId xmlns:a16="http://schemas.microsoft.com/office/drawing/2014/main" id="{3D3F20BF-4635-427A-AB93-C31E3B60F8CB}"/>
+              </a:ext>
+            </a:extLst>
+          </p:cNvPr>
+          <p:cNvSpPr/>
+          <p:nvPr/>
+        </p:nvSpPr>
+        <p:spPr>
+          <a:xfrm>
+            <a:off x="2512089" y="983226"/>
+            <a:ext cx="9679912" cy="5874774"/>
+          </a:xfrm>
+          <a:prstGeom prst="rect">
+            <a:avLst/>
+          </a:prstGeom>
+          <a:solidFill>
+            <a:schemeClr val="bg1"/>
+          </a:solidFill>
+          <a:ln>
+            <a:noFill/>
+          </a:ln>
+        </p:spPr>
+        <p:style>
+          <a:lnRef idx="2">
+            <a:schemeClr val="accent1">
+              <a:shade val="50000"/>
+            </a:schemeClr>
+          </a:lnRef>
+          <a:fillRef idx="1">
+            <a:schemeClr val="accent1"/>
+          </a:fillRef>
+          <a:effectRef idx="0">
+            <a:schemeClr val="accent1"/>
+          </a:effectRef>
+          <a:fontRef idx="minor">
+            <a:schemeClr val="lt1"/>
+          </a:fontRef>
+        </p:style>
+        <p:txBody>
+          <a:bodyPr rtlCol="0" anchor="ctr"/>
+          <a:lstStyle/>
+          <a:p>
+            <a:pPr algn="ctr"/>
+            <a:endParaRPr lang="pt-BR"/>
+          </a:p>
+        </p:txBody>
+      </p:sp>
+      <p:sp>
+        <p:nvSpPr>
+          <p:cNvPr id="7" name="Retângulo: Cantos Arredondados 6">
+            <a:extLst>
+              <a:ext uri="{FF2B5EF4-FFF2-40B4-BE49-F238E27FC236}">
+                <a16:creationId xmlns:a16="http://schemas.microsoft.com/office/drawing/2014/main" id="{773039DA-787B-40B5-A9EB-CFE38D0F2C9E}"/>
+              </a:ext>
+            </a:extLst>
+          </p:cNvPr>
+          <p:cNvSpPr/>
+          <p:nvPr/>
+        </p:nvSpPr>
+        <p:spPr>
+          <a:xfrm>
+            <a:off x="357257" y="983226"/>
+            <a:ext cx="1692000" cy="730800"/>
+          </a:xfrm>
+          <a:prstGeom prst="roundRect">
+            <a:avLst/>
+          </a:prstGeom>
+          <a:solidFill>
+            <a:schemeClr val="bg1"/>
+          </a:solidFill>
+          <a:ln>
+            <a:noFill/>
+          </a:ln>
+          <a:effectLst>
+            <a:outerShdw blurRad="63500" dist="12700" sx="102000" sy="102000" algn="ctr" rotWithShape="0">
+              <a:prstClr val="black">
+                <a:alpha val="20000"/>
+              </a:prstClr>
+            </a:outerShdw>
+          </a:effectLst>
+        </p:spPr>
+        <p:style>
+          <a:lnRef idx="2">
+            <a:schemeClr val="accent1">
+              <a:shade val="50000"/>
+            </a:schemeClr>
+          </a:lnRef>
+          <a:fillRef idx="1">
+            <a:schemeClr val="accent1"/>
+          </a:fillRef>
+          <a:effectRef idx="0">
+            <a:schemeClr val="accent1"/>
+          </a:effectRef>
+          <a:fontRef idx="minor">
+            <a:schemeClr val="lt1"/>
+          </a:fontRef>
+        </p:style>
+        <p:txBody>
+          <a:bodyPr rtlCol="0" anchor="ctr"/>
+          <a:lstStyle/>
+          <a:p>
+            <a:pPr algn="ctr"/>
+            <a:endParaRPr lang="pt-BR"/>
+          </a:p>
+        </p:txBody>
+      </p:sp>
+      <p:sp>
+        <p:nvSpPr>
+          <p:cNvPr id="8" name="Retângulo: Cantos Arredondados 7">
+            <a:extLst>
+              <a:ext uri="{FF2B5EF4-FFF2-40B4-BE49-F238E27FC236}">
+                <a16:creationId xmlns:a16="http://schemas.microsoft.com/office/drawing/2014/main" id="{5940423C-2A5E-4A1D-81E7-8C3AA0ECB6E4}"/>
+              </a:ext>
+            </a:extLst>
+          </p:cNvPr>
+          <p:cNvSpPr/>
+          <p:nvPr/>
+        </p:nvSpPr>
+        <p:spPr>
+          <a:xfrm>
+            <a:off x="357257" y="1930336"/>
+            <a:ext cx="1692000" cy="730800"/>
+          </a:xfrm>
+          <a:prstGeom prst="roundRect">
+            <a:avLst/>
+          </a:prstGeom>
+          <a:solidFill>
+            <a:schemeClr val="bg1"/>
+          </a:solidFill>
+          <a:ln>
+            <a:noFill/>
+          </a:ln>
+          <a:effectLst>
+            <a:outerShdw blurRad="63500" dist="12700" sx="102000" sy="102000" algn="ctr" rotWithShape="0">
+              <a:prstClr val="black">
+                <a:alpha val="20000"/>
+              </a:prstClr>
+            </a:outerShdw>
+          </a:effectLst>
+        </p:spPr>
+        <p:style>
+          <a:lnRef idx="2">
+            <a:schemeClr val="accent1">
+              <a:shade val="50000"/>
+            </a:schemeClr>
+          </a:lnRef>
+          <a:fillRef idx="1">
+            <a:schemeClr val="accent1"/>
+          </a:fillRef>
+          <a:effectRef idx="0">
+            <a:schemeClr val="accent1"/>
+          </a:effectRef>
+          <a:fontRef idx="minor">
+            <a:schemeClr val="lt1"/>
+          </a:fontRef>
+        </p:style>
+        <p:txBody>
+          <a:bodyPr rtlCol="0" anchor="ctr"/>
+          <a:lstStyle/>
+          <a:p>
+            <a:pPr algn="ctr"/>
+            <a:endParaRPr lang="pt-BR"/>
+          </a:p>
+        </p:txBody>
+      </p:sp>
+      <p:sp>
+        <p:nvSpPr>
+          <p:cNvPr id="9" name="Retângulo: Cantos Arredondados 8">
+            <a:extLst>
+              <a:ext uri="{FF2B5EF4-FFF2-40B4-BE49-F238E27FC236}">
+                <a16:creationId xmlns:a16="http://schemas.microsoft.com/office/drawing/2014/main" id="{B834F2ED-C32C-4A49-A857-E8404A65F7FD}"/>
+              </a:ext>
+            </a:extLst>
+          </p:cNvPr>
+          <p:cNvSpPr/>
+          <p:nvPr/>
+        </p:nvSpPr>
+        <p:spPr>
+          <a:xfrm>
+            <a:off x="357257" y="2877446"/>
+            <a:ext cx="1692000" cy="730800"/>
+          </a:xfrm>
+          <a:prstGeom prst="roundRect">
+            <a:avLst/>
+          </a:prstGeom>
+          <a:solidFill>
+            <a:schemeClr val="bg1"/>
+          </a:solidFill>
+          <a:ln>
+            <a:noFill/>
+          </a:ln>
+          <a:effectLst>
+            <a:outerShdw blurRad="63500" dist="12700" sx="102000" sy="102000" algn="ctr" rotWithShape="0">
+              <a:prstClr val="black">
+                <a:alpha val="20000"/>
+              </a:prstClr>
+            </a:outerShdw>
+          </a:effectLst>
+        </p:spPr>
+        <p:style>
+          <a:lnRef idx="2">
+            <a:schemeClr val="accent1">
+              <a:shade val="50000"/>
+            </a:schemeClr>
+          </a:lnRef>
+          <a:fillRef idx="1">
+            <a:schemeClr val="accent1"/>
+          </a:fillRef>
+          <a:effectRef idx="0">
+            <a:schemeClr val="accent1"/>
+          </a:effectRef>
+          <a:fontRef idx="minor">
+            <a:schemeClr val="lt1"/>
+          </a:fontRef>
+        </p:style>
+        <p:txBody>
+          <a:bodyPr rtlCol="0" anchor="ctr"/>
+          <a:lstStyle/>
+          <a:p>
+            <a:pPr algn="ctr"/>
+            <a:endParaRPr lang="pt-BR"/>
+          </a:p>
+        </p:txBody>
+      </p:sp>
+      <p:sp>
+        <p:nvSpPr>
+          <p:cNvPr id="10" name="Retângulo: Cantos Arredondados 9">
+            <a:extLst>
+              <a:ext uri="{FF2B5EF4-FFF2-40B4-BE49-F238E27FC236}">
+                <a16:creationId xmlns:a16="http://schemas.microsoft.com/office/drawing/2014/main" id="{D8522C8E-7A75-473B-88FA-1B914A8095EB}"/>
+              </a:ext>
+            </a:extLst>
+          </p:cNvPr>
+          <p:cNvSpPr/>
+          <p:nvPr/>
+        </p:nvSpPr>
+        <p:spPr>
+          <a:xfrm>
+            <a:off x="357257" y="3824556"/>
+            <a:ext cx="1692000" cy="730800"/>
+          </a:xfrm>
+          <a:prstGeom prst="roundRect">
+            <a:avLst/>
+          </a:prstGeom>
+          <a:solidFill>
+            <a:schemeClr val="bg1"/>
+          </a:solidFill>
+          <a:ln>
+            <a:noFill/>
+          </a:ln>
+          <a:effectLst>
+            <a:outerShdw blurRad="63500" dist="12700" sx="102000" sy="102000" algn="ctr" rotWithShape="0">
+              <a:prstClr val="black">
+                <a:alpha val="20000"/>
+              </a:prstClr>
+            </a:outerShdw>
+          </a:effectLst>
+        </p:spPr>
+        <p:style>
+          <a:lnRef idx="2">
+            <a:schemeClr val="accent1">
+              <a:shade val="50000"/>
+            </a:schemeClr>
+          </a:lnRef>
+          <a:fillRef idx="1">
+            <a:schemeClr val="accent1"/>
+          </a:fillRef>
+          <a:effectRef idx="0">
+            <a:schemeClr val="accent1"/>
+          </a:effectRef>
+          <a:fontRef idx="minor">
+            <a:schemeClr val="lt1"/>
+          </a:fontRef>
+        </p:style>
+        <p:txBody>
+          <a:bodyPr rtlCol="0" anchor="ctr"/>
+          <a:lstStyle/>
+          <a:p>
+            <a:pPr algn="ctr"/>
+            <a:endParaRPr lang="pt-BR"/>
+          </a:p>
+        </p:txBody>
+      </p:sp>
+      <p:sp>
+        <p:nvSpPr>
+          <p:cNvPr id="11" name="Retângulo: Cantos Arredondados 10">
+            <a:extLst>
+              <a:ext uri="{FF2B5EF4-FFF2-40B4-BE49-F238E27FC236}">
+                <a16:creationId xmlns:a16="http://schemas.microsoft.com/office/drawing/2014/main" id="{ACDFA990-82BD-43B0-A13A-2B8A81152B0E}"/>
+              </a:ext>
+            </a:extLst>
+          </p:cNvPr>
+          <p:cNvSpPr/>
+          <p:nvPr/>
+        </p:nvSpPr>
+        <p:spPr>
+          <a:xfrm rot="5400000">
+            <a:off x="-131815" y="5345285"/>
+            <a:ext cx="1692000" cy="730800"/>
+          </a:xfrm>
+          <a:prstGeom prst="roundRect">
+            <a:avLst/>
+          </a:prstGeom>
+          <a:solidFill>
+            <a:schemeClr val="bg1"/>
+          </a:solidFill>
+          <a:ln>
+            <a:noFill/>
+          </a:ln>
+          <a:effectLst>
+            <a:outerShdw blurRad="63500" dist="12700" sx="102000" sy="102000" algn="ctr" rotWithShape="0">
+              <a:prstClr val="black">
+                <a:alpha val="20000"/>
+              </a:prstClr>
+            </a:outerShdw>
+          </a:effectLst>
+        </p:spPr>
+        <p:style>
+          <a:lnRef idx="2">
+            <a:schemeClr val="accent1">
+              <a:shade val="50000"/>
+            </a:schemeClr>
+          </a:lnRef>
+          <a:fillRef idx="1">
+            <a:schemeClr val="accent1"/>
+          </a:fillRef>
+          <a:effectRef idx="0">
+            <a:schemeClr val="accent1"/>
+          </a:effectRef>
+          <a:fontRef idx="minor">
+            <a:schemeClr val="lt1"/>
+          </a:fontRef>
+        </p:style>
+        <p:txBody>
+          <a:bodyPr rtlCol="0" anchor="ctr"/>
+          <a:lstStyle/>
+          <a:p>
+            <a:pPr algn="ctr"/>
+            <a:endParaRPr lang="pt-BR"/>
+          </a:p>
+        </p:txBody>
+      </p:sp>
+      <p:sp>
+        <p:nvSpPr>
+          <p:cNvPr id="12" name="Retângulo: Cantos Arredondados 11">
+            <a:extLst>
+              <a:ext uri="{FF2B5EF4-FFF2-40B4-BE49-F238E27FC236}">
+                <a16:creationId xmlns:a16="http://schemas.microsoft.com/office/drawing/2014/main" id="{ECC13D33-47D7-43F6-BDF4-2E3EF162FD33}"/>
+              </a:ext>
+            </a:extLst>
+          </p:cNvPr>
+          <p:cNvSpPr/>
+          <p:nvPr/>
+        </p:nvSpPr>
+        <p:spPr>
+          <a:xfrm rot="5400000">
+            <a:off x="846331" y="5345285"/>
+            <a:ext cx="1692000" cy="730800"/>
+          </a:xfrm>
+          <a:prstGeom prst="roundRect">
+            <a:avLst/>
+          </a:prstGeom>
+          <a:solidFill>
+            <a:schemeClr val="bg1"/>
+          </a:solidFill>
+          <a:ln>
+            <a:noFill/>
+          </a:ln>
+          <a:effectLst>
+            <a:outerShdw blurRad="63500" dist="12700" sx="102000" sy="102000" algn="ctr" rotWithShape="0">
+              <a:prstClr val="black">
+                <a:alpha val="20000"/>
+              </a:prstClr>
+            </a:outerShdw>
+          </a:effectLst>
+        </p:spPr>
+        <p:style>
+          <a:lnRef idx="2">
+            <a:schemeClr val="accent1">
+              <a:shade val="50000"/>
+            </a:schemeClr>
+          </a:lnRef>
+          <a:fillRef idx="1">
+            <a:schemeClr val="accent1"/>
+          </a:fillRef>
+          <a:effectRef idx="0">
+            <a:schemeClr val="accent1"/>
+          </a:effectRef>
+          <a:fontRef idx="minor">
+            <a:schemeClr val="lt1"/>
+          </a:fontRef>
+        </p:style>
+        <p:txBody>
+          <a:bodyPr rtlCol="0" anchor="ctr"/>
+          <a:lstStyle/>
+          <a:p>
+            <a:pPr algn="ctr"/>
+            <a:endParaRPr lang="pt-BR"/>
+          </a:p>
+        </p:txBody>
+      </p:sp>
+    </p:spTree>
+    <p:extLst>
+      <p:ext uri="{BB962C8B-B14F-4D97-AF65-F5344CB8AC3E}">
+        <p14:creationId xmlns:p14="http://schemas.microsoft.com/office/powerpoint/2010/main" val="3706765019"/>
       </p:ext>
     </p:extLst>
   </p:cSld>

</xml_diff>

<commit_message>
test: aprimoramento do plano de fundo de Fundo_hashtagtreinamentos.pptx
</commit_message>
<xml_diff>
--- a/Power BI/Fundo_hashtagtreinamentos.pptx
+++ b/Power BI/Fundo_hashtagtreinamentos.pptx
@@ -209,7 +209,7 @@
           <a:p>
             <a:fld id="{89898387-25CB-48BF-831D-C9CB1B925B56}" type="datetimeFigureOut">
               <a:rPr lang="pt-BR" smtClean="0"/>
-              <a:t>23/04/2022</a:t>
+              <a:t>28/04/2022</a:t>
             </a:fld>
             <a:endParaRPr lang="pt-BR"/>
           </a:p>
@@ -813,7 +813,7 @@
           <a:p>
             <a:fld id="{C548DC58-09D5-4E30-B733-E965AEE8D055}" type="datetimeFigureOut">
               <a:rPr lang="pt-BR" smtClean="0"/>
-              <a:t>23/04/2022</a:t>
+              <a:t>28/04/2022</a:t>
             </a:fld>
             <a:endParaRPr lang="pt-BR"/>
           </a:p>
@@ -1011,7 +1011,7 @@
           <a:p>
             <a:fld id="{C548DC58-09D5-4E30-B733-E965AEE8D055}" type="datetimeFigureOut">
               <a:rPr lang="pt-BR" smtClean="0"/>
-              <a:t>23/04/2022</a:t>
+              <a:t>28/04/2022</a:t>
             </a:fld>
             <a:endParaRPr lang="pt-BR"/>
           </a:p>
@@ -1219,7 +1219,7 @@
           <a:p>
             <a:fld id="{C548DC58-09D5-4E30-B733-E965AEE8D055}" type="datetimeFigureOut">
               <a:rPr lang="pt-BR" smtClean="0"/>
-              <a:t>23/04/2022</a:t>
+              <a:t>28/04/2022</a:t>
             </a:fld>
             <a:endParaRPr lang="pt-BR"/>
           </a:p>
@@ -1417,7 +1417,7 @@
           <a:p>
             <a:fld id="{C548DC58-09D5-4E30-B733-E965AEE8D055}" type="datetimeFigureOut">
               <a:rPr lang="pt-BR" smtClean="0"/>
-              <a:t>23/04/2022</a:t>
+              <a:t>28/04/2022</a:t>
             </a:fld>
             <a:endParaRPr lang="pt-BR"/>
           </a:p>
@@ -1692,7 +1692,7 @@
           <a:p>
             <a:fld id="{C548DC58-09D5-4E30-B733-E965AEE8D055}" type="datetimeFigureOut">
               <a:rPr lang="pt-BR" smtClean="0"/>
-              <a:t>23/04/2022</a:t>
+              <a:t>28/04/2022</a:t>
             </a:fld>
             <a:endParaRPr lang="pt-BR"/>
           </a:p>
@@ -1957,7 +1957,7 @@
           <a:p>
             <a:fld id="{C548DC58-09D5-4E30-B733-E965AEE8D055}" type="datetimeFigureOut">
               <a:rPr lang="pt-BR" smtClean="0"/>
-              <a:t>23/04/2022</a:t>
+              <a:t>28/04/2022</a:t>
             </a:fld>
             <a:endParaRPr lang="pt-BR"/>
           </a:p>
@@ -2369,7 +2369,7 @@
           <a:p>
             <a:fld id="{C548DC58-09D5-4E30-B733-E965AEE8D055}" type="datetimeFigureOut">
               <a:rPr lang="pt-BR" smtClean="0"/>
-              <a:t>23/04/2022</a:t>
+              <a:t>28/04/2022</a:t>
             </a:fld>
             <a:endParaRPr lang="pt-BR"/>
           </a:p>
@@ -2510,7 +2510,7 @@
           <a:p>
             <a:fld id="{C548DC58-09D5-4E30-B733-E965AEE8D055}" type="datetimeFigureOut">
               <a:rPr lang="pt-BR" smtClean="0"/>
-              <a:t>23/04/2022</a:t>
+              <a:t>28/04/2022</a:t>
             </a:fld>
             <a:endParaRPr lang="pt-BR"/>
           </a:p>
@@ -2623,7 +2623,7 @@
           <a:p>
             <a:fld id="{C548DC58-09D5-4E30-B733-E965AEE8D055}" type="datetimeFigureOut">
               <a:rPr lang="pt-BR" smtClean="0"/>
-              <a:t>23/04/2022</a:t>
+              <a:t>28/04/2022</a:t>
             </a:fld>
             <a:endParaRPr lang="pt-BR"/>
           </a:p>
@@ -2934,7 +2934,7 @@
           <a:p>
             <a:fld id="{C548DC58-09D5-4E30-B733-E965AEE8D055}" type="datetimeFigureOut">
               <a:rPr lang="pt-BR" smtClean="0"/>
-              <a:t>23/04/2022</a:t>
+              <a:t>28/04/2022</a:t>
             </a:fld>
             <a:endParaRPr lang="pt-BR"/>
           </a:p>
@@ -3222,7 +3222,7 @@
           <a:p>
             <a:fld id="{C548DC58-09D5-4E30-B733-E965AEE8D055}" type="datetimeFigureOut">
               <a:rPr lang="pt-BR" smtClean="0"/>
-              <a:t>23/04/2022</a:t>
+              <a:t>28/04/2022</a:t>
             </a:fld>
             <a:endParaRPr lang="pt-BR"/>
           </a:p>
@@ -3463,7 +3463,7 @@
           <a:p>
             <a:fld id="{C548DC58-09D5-4E30-B733-E965AEE8D055}" type="datetimeFigureOut">
               <a:rPr lang="pt-BR" smtClean="0"/>
-              <a:t>23/04/2022</a:t>
+              <a:t>28/04/2022</a:t>
             </a:fld>
             <a:endParaRPr lang="pt-BR"/>
           </a:p>
@@ -4318,7 +4318,7 @@
             <a:avLst/>
           </a:prstGeom>
           <a:solidFill>
-            <a:schemeClr val="bg1"/>
+            <a:srgbClr val="783EFD"/>
           </a:solidFill>
           <a:ln>
             <a:noFill/>
@@ -4377,7 +4377,7 @@
             <a:avLst/>
           </a:prstGeom>
           <a:solidFill>
-            <a:schemeClr val="bg1"/>
+            <a:srgbClr val="FE8F65"/>
           </a:solidFill>
           <a:ln>
             <a:noFill/>
@@ -4415,6 +4415,370 @@
           </a:p>
         </p:txBody>
       </p:sp>
+      <p:sp>
+        <p:nvSpPr>
+          <p:cNvPr id="2" name="Retângulo 1">
+            <a:extLst>
+              <a:ext uri="{FF2B5EF4-FFF2-40B4-BE49-F238E27FC236}">
+                <a16:creationId xmlns:a16="http://schemas.microsoft.com/office/drawing/2014/main" id="{DCC8D58F-296B-4A13-8EDB-6502E4FF23F9}"/>
+              </a:ext>
+            </a:extLst>
+          </p:cNvPr>
+          <p:cNvSpPr/>
+          <p:nvPr/>
+        </p:nvSpPr>
+        <p:spPr>
+          <a:xfrm>
+            <a:off x="3533927" y="1970462"/>
+            <a:ext cx="522000" cy="522000"/>
+          </a:xfrm>
+          <a:prstGeom prst="rect">
+            <a:avLst/>
+          </a:prstGeom>
+          <a:solidFill>
+            <a:srgbClr val="FFCD41"/>
+          </a:solidFill>
+          <a:ln/>
+          <a:effectLst>
+            <a:outerShdw blurRad="63500" dist="12700" sx="102000" sy="102000" algn="ctr" rotWithShape="0">
+              <a:prstClr val="black">
+                <a:alpha val="40000"/>
+              </a:prstClr>
+            </a:outerShdw>
+          </a:effectLst>
+        </p:spPr>
+        <p:style>
+          <a:lnRef idx="2">
+            <a:schemeClr val="accent1">
+              <a:shade val="50000"/>
+            </a:schemeClr>
+          </a:lnRef>
+          <a:fillRef idx="1">
+            <a:schemeClr val="accent1"/>
+          </a:fillRef>
+          <a:effectRef idx="0">
+            <a:schemeClr val="accent1"/>
+          </a:effectRef>
+          <a:fontRef idx="minor">
+            <a:schemeClr val="lt1"/>
+          </a:fontRef>
+        </p:style>
+        <p:txBody>
+          <a:bodyPr rtlCol="0" anchor="ctr"/>
+          <a:lstStyle/>
+          <a:p>
+            <a:pPr algn="ctr"/>
+            <a:endParaRPr lang="pt-BR"/>
+          </a:p>
+        </p:txBody>
+      </p:sp>
+      <p:sp>
+        <p:nvSpPr>
+          <p:cNvPr id="13" name="Retângulo 12">
+            <a:extLst>
+              <a:ext uri="{FF2B5EF4-FFF2-40B4-BE49-F238E27FC236}">
+                <a16:creationId xmlns:a16="http://schemas.microsoft.com/office/drawing/2014/main" id="{EFED8490-CF6F-45E7-BD60-2EB4349D7256}"/>
+              </a:ext>
+            </a:extLst>
+          </p:cNvPr>
+          <p:cNvSpPr/>
+          <p:nvPr/>
+        </p:nvSpPr>
+        <p:spPr>
+          <a:xfrm>
+            <a:off x="5681439" y="1970462"/>
+            <a:ext cx="522000" cy="522000"/>
+          </a:xfrm>
+          <a:prstGeom prst="rect">
+            <a:avLst/>
+          </a:prstGeom>
+          <a:solidFill>
+            <a:srgbClr val="773FFB"/>
+          </a:solidFill>
+          <a:ln/>
+          <a:effectLst>
+            <a:outerShdw blurRad="63500" dist="12700" sx="102000" sy="102000" algn="ctr" rotWithShape="0">
+              <a:prstClr val="black">
+                <a:alpha val="40000"/>
+              </a:prstClr>
+            </a:outerShdw>
+          </a:effectLst>
+        </p:spPr>
+        <p:style>
+          <a:lnRef idx="2">
+            <a:schemeClr val="accent1">
+              <a:shade val="50000"/>
+            </a:schemeClr>
+          </a:lnRef>
+          <a:fillRef idx="1">
+            <a:schemeClr val="accent1"/>
+          </a:fillRef>
+          <a:effectRef idx="0">
+            <a:schemeClr val="accent1"/>
+          </a:effectRef>
+          <a:fontRef idx="minor">
+            <a:schemeClr val="lt1"/>
+          </a:fontRef>
+        </p:style>
+        <p:txBody>
+          <a:bodyPr rtlCol="0" anchor="ctr"/>
+          <a:lstStyle/>
+          <a:p>
+            <a:pPr algn="ctr"/>
+            <a:endParaRPr lang="pt-BR"/>
+          </a:p>
+        </p:txBody>
+      </p:sp>
+      <p:sp>
+        <p:nvSpPr>
+          <p:cNvPr id="14" name="Retângulo 13">
+            <a:extLst>
+              <a:ext uri="{FF2B5EF4-FFF2-40B4-BE49-F238E27FC236}">
+                <a16:creationId xmlns:a16="http://schemas.microsoft.com/office/drawing/2014/main" id="{BE5F0E7E-6471-4259-BEDE-6CE856495517}"/>
+              </a:ext>
+            </a:extLst>
+          </p:cNvPr>
+          <p:cNvSpPr/>
+          <p:nvPr/>
+        </p:nvSpPr>
+        <p:spPr>
+          <a:xfrm>
+            <a:off x="3523879" y="2839792"/>
+            <a:ext cx="522000" cy="522000"/>
+          </a:xfrm>
+          <a:prstGeom prst="rect">
+            <a:avLst/>
+          </a:prstGeom>
+          <a:solidFill>
+            <a:srgbClr val="FE8F65"/>
+          </a:solidFill>
+          <a:ln/>
+          <a:effectLst>
+            <a:outerShdw blurRad="63500" dist="12700" sx="102000" sy="102000" algn="ctr" rotWithShape="0">
+              <a:prstClr val="black">
+                <a:alpha val="40000"/>
+              </a:prstClr>
+            </a:outerShdw>
+          </a:effectLst>
+        </p:spPr>
+        <p:style>
+          <a:lnRef idx="2">
+            <a:schemeClr val="accent1">
+              <a:shade val="50000"/>
+            </a:schemeClr>
+          </a:lnRef>
+          <a:fillRef idx="1">
+            <a:schemeClr val="accent1"/>
+          </a:fillRef>
+          <a:effectRef idx="0">
+            <a:schemeClr val="accent1"/>
+          </a:effectRef>
+          <a:fontRef idx="minor">
+            <a:schemeClr val="lt1"/>
+          </a:fontRef>
+        </p:style>
+        <p:txBody>
+          <a:bodyPr rtlCol="0" anchor="ctr"/>
+          <a:lstStyle/>
+          <a:p>
+            <a:pPr algn="ctr"/>
+            <a:endParaRPr lang="pt-BR"/>
+          </a:p>
+        </p:txBody>
+      </p:sp>
+      <p:sp>
+        <p:nvSpPr>
+          <p:cNvPr id="15" name="Retângulo 14">
+            <a:extLst>
+              <a:ext uri="{FF2B5EF4-FFF2-40B4-BE49-F238E27FC236}">
+                <a16:creationId xmlns:a16="http://schemas.microsoft.com/office/drawing/2014/main" id="{723525E3-74E4-4C02-97DD-1A719515FFFD}"/>
+              </a:ext>
+            </a:extLst>
+          </p:cNvPr>
+          <p:cNvSpPr/>
+          <p:nvPr/>
+        </p:nvSpPr>
+        <p:spPr>
+          <a:xfrm>
+            <a:off x="5681439" y="2839792"/>
+            <a:ext cx="522000" cy="522000"/>
+          </a:xfrm>
+          <a:prstGeom prst="rect">
+            <a:avLst/>
+          </a:prstGeom>
+          <a:solidFill>
+            <a:srgbClr val="4FDFB1"/>
+          </a:solidFill>
+          <a:ln/>
+          <a:effectLst>
+            <a:outerShdw blurRad="63500" dist="12700" sx="102000" sy="102000" algn="ctr" rotWithShape="0">
+              <a:prstClr val="black">
+                <a:alpha val="40000"/>
+              </a:prstClr>
+            </a:outerShdw>
+          </a:effectLst>
+        </p:spPr>
+        <p:style>
+          <a:lnRef idx="2">
+            <a:schemeClr val="accent1">
+              <a:shade val="50000"/>
+            </a:schemeClr>
+          </a:lnRef>
+          <a:fillRef idx="1">
+            <a:schemeClr val="accent1"/>
+          </a:fillRef>
+          <a:effectRef idx="0">
+            <a:schemeClr val="accent1"/>
+          </a:effectRef>
+          <a:fontRef idx="minor">
+            <a:schemeClr val="lt1"/>
+          </a:fontRef>
+        </p:style>
+        <p:txBody>
+          <a:bodyPr rtlCol="0" anchor="ctr"/>
+          <a:lstStyle/>
+          <a:p>
+            <a:pPr algn="ctr"/>
+            <a:endParaRPr lang="pt-BR"/>
+          </a:p>
+        </p:txBody>
+      </p:sp>
+      <p:sp>
+        <p:nvSpPr>
+          <p:cNvPr id="3" name="Retângulo 2">
+            <a:extLst>
+              <a:ext uri="{FF2B5EF4-FFF2-40B4-BE49-F238E27FC236}">
+                <a16:creationId xmlns:a16="http://schemas.microsoft.com/office/drawing/2014/main" id="{06C2BFB8-BF14-4B64-A9A4-3787EDCBC597}"/>
+              </a:ext>
+            </a:extLst>
+          </p:cNvPr>
+          <p:cNvSpPr/>
+          <p:nvPr/>
+        </p:nvSpPr>
+        <p:spPr>
+          <a:xfrm>
+            <a:off x="8006082" y="1970462"/>
+            <a:ext cx="1544400" cy="1299600"/>
+          </a:xfrm>
+          <a:prstGeom prst="rect">
+            <a:avLst/>
+          </a:prstGeom>
+          <a:solidFill>
+            <a:srgbClr val="B9A1F9"/>
+          </a:solidFill>
+        </p:spPr>
+        <p:style>
+          <a:lnRef idx="2">
+            <a:schemeClr val="accent1">
+              <a:shade val="50000"/>
+            </a:schemeClr>
+          </a:lnRef>
+          <a:fillRef idx="1">
+            <a:schemeClr val="accent1"/>
+          </a:fillRef>
+          <a:effectRef idx="0">
+            <a:schemeClr val="accent1"/>
+          </a:effectRef>
+          <a:fontRef idx="minor">
+            <a:schemeClr val="lt1"/>
+          </a:fontRef>
+        </p:style>
+        <p:txBody>
+          <a:bodyPr rtlCol="0" anchor="ctr"/>
+          <a:lstStyle/>
+          <a:p>
+            <a:pPr algn="ctr"/>
+            <a:endParaRPr lang="pt-BR"/>
+          </a:p>
+        </p:txBody>
+      </p:sp>
+      <p:sp>
+        <p:nvSpPr>
+          <p:cNvPr id="16" name="Retângulo 15">
+            <a:extLst>
+              <a:ext uri="{FF2B5EF4-FFF2-40B4-BE49-F238E27FC236}">
+                <a16:creationId xmlns:a16="http://schemas.microsoft.com/office/drawing/2014/main" id="{13C597F6-8341-4AD7-A838-9AB49AF9189A}"/>
+              </a:ext>
+            </a:extLst>
+          </p:cNvPr>
+          <p:cNvSpPr/>
+          <p:nvPr/>
+        </p:nvSpPr>
+        <p:spPr>
+          <a:xfrm>
+            <a:off x="10004299" y="1992448"/>
+            <a:ext cx="1544400" cy="1299600"/>
+          </a:xfrm>
+          <a:prstGeom prst="rect">
+            <a:avLst/>
+          </a:prstGeom>
+          <a:solidFill>
+            <a:srgbClr val="F8D377"/>
+          </a:solidFill>
+        </p:spPr>
+        <p:style>
+          <a:lnRef idx="2">
+            <a:schemeClr val="accent1">
+              <a:shade val="50000"/>
+            </a:schemeClr>
+          </a:lnRef>
+          <a:fillRef idx="1">
+            <a:schemeClr val="accent1"/>
+          </a:fillRef>
+          <a:effectRef idx="0">
+            <a:schemeClr val="accent1"/>
+          </a:effectRef>
+          <a:fontRef idx="minor">
+            <a:schemeClr val="lt1"/>
+          </a:fontRef>
+        </p:style>
+        <p:txBody>
+          <a:bodyPr rtlCol="0" anchor="ctr"/>
+          <a:lstStyle/>
+          <a:p>
+            <a:pPr algn="ctr"/>
+            <a:endParaRPr lang="pt-BR"/>
+          </a:p>
+        </p:txBody>
+      </p:sp>
+      <p:cxnSp>
+        <p:nvCxnSpPr>
+          <p:cNvPr id="20" name="Conector reto 19">
+            <a:extLst>
+              <a:ext uri="{FF2B5EF4-FFF2-40B4-BE49-F238E27FC236}">
+                <a16:creationId xmlns:a16="http://schemas.microsoft.com/office/drawing/2014/main" id="{A6992095-F34D-4CE3-83E6-85F30C966A0F}"/>
+              </a:ext>
+            </a:extLst>
+          </p:cNvPr>
+          <p:cNvCxnSpPr>
+            <a:cxnSpLocks/>
+          </p:cNvCxnSpPr>
+          <p:nvPr/>
+        </p:nvCxnSpPr>
+        <p:spPr>
+          <a:xfrm>
+            <a:off x="3945395" y="4472800"/>
+            <a:ext cx="0" cy="391885"/>
+          </a:xfrm>
+          <a:prstGeom prst="line">
+            <a:avLst/>
+          </a:prstGeom>
+        </p:spPr>
+        <p:style>
+          <a:lnRef idx="3">
+            <a:schemeClr val="accent2"/>
+          </a:lnRef>
+          <a:fillRef idx="0">
+            <a:schemeClr val="accent2"/>
+          </a:fillRef>
+          <a:effectRef idx="2">
+            <a:schemeClr val="accent2"/>
+          </a:effectRef>
+          <a:fontRef idx="minor">
+            <a:schemeClr val="tx1"/>
+          </a:fontRef>
+        </p:style>
+      </p:cxnSp>
     </p:spTree>
     <p:extLst>
       <p:ext uri="{BB962C8B-B14F-4D97-AF65-F5344CB8AC3E}">
@@ -4805,10 +5169,10 @@
       </p:sp>
       <p:sp>
         <p:nvSpPr>
-          <p:cNvPr id="11" name="Retângulo: Cantos Arredondados 10">
-            <a:extLst>
-              <a:ext uri="{FF2B5EF4-FFF2-40B4-BE49-F238E27FC236}">
-                <a16:creationId xmlns:a16="http://schemas.microsoft.com/office/drawing/2014/main" id="{ACDFA990-82BD-43B0-A13A-2B8A81152B0E}"/>
+          <p:cNvPr id="13" name="Retângulo: Cantos Arredondados 12">
+            <a:extLst>
+              <a:ext uri="{FF2B5EF4-FFF2-40B4-BE49-F238E27FC236}">
+                <a16:creationId xmlns:a16="http://schemas.microsoft.com/office/drawing/2014/main" id="{9FCB5D05-5244-4250-89AB-28A0E64F374E}"/>
               </a:ext>
             </a:extLst>
           </p:cNvPr>
@@ -4816,68 +5180,9 @@
           <p:nvPr/>
         </p:nvSpPr>
         <p:spPr>
-          <a:xfrm rot="5400000">
-            <a:off x="-131815" y="5345285"/>
-            <a:ext cx="1692000" cy="730800"/>
-          </a:xfrm>
-          <a:prstGeom prst="roundRect">
-            <a:avLst/>
-          </a:prstGeom>
-          <a:solidFill>
-            <a:schemeClr val="bg1"/>
-          </a:solidFill>
-          <a:ln>
-            <a:noFill/>
-          </a:ln>
-          <a:effectLst>
-            <a:outerShdw blurRad="63500" dist="12700" sx="102000" sy="102000" algn="ctr" rotWithShape="0">
-              <a:prstClr val="black">
-                <a:alpha val="20000"/>
-              </a:prstClr>
-            </a:outerShdw>
-          </a:effectLst>
-        </p:spPr>
-        <p:style>
-          <a:lnRef idx="2">
-            <a:schemeClr val="accent1">
-              <a:shade val="50000"/>
-            </a:schemeClr>
-          </a:lnRef>
-          <a:fillRef idx="1">
-            <a:schemeClr val="accent1"/>
-          </a:fillRef>
-          <a:effectRef idx="0">
-            <a:schemeClr val="accent1"/>
-          </a:effectRef>
-          <a:fontRef idx="minor">
-            <a:schemeClr val="lt1"/>
-          </a:fontRef>
-        </p:style>
-        <p:txBody>
-          <a:bodyPr rtlCol="0" anchor="ctr"/>
-          <a:lstStyle/>
-          <a:p>
-            <a:pPr algn="ctr"/>
-            <a:endParaRPr lang="pt-BR"/>
-          </a:p>
-        </p:txBody>
-      </p:sp>
-      <p:sp>
-        <p:nvSpPr>
-          <p:cNvPr id="12" name="Retângulo: Cantos Arredondados 11">
-            <a:extLst>
-              <a:ext uri="{FF2B5EF4-FFF2-40B4-BE49-F238E27FC236}">
-                <a16:creationId xmlns:a16="http://schemas.microsoft.com/office/drawing/2014/main" id="{ECC13D33-47D7-43F6-BDF4-2E3EF162FD33}"/>
-              </a:ext>
-            </a:extLst>
-          </p:cNvPr>
-          <p:cNvSpPr/>
-          <p:nvPr/>
-        </p:nvSpPr>
-        <p:spPr>
-          <a:xfrm rot="5400000">
-            <a:off x="846331" y="5345285"/>
-            <a:ext cx="1692000" cy="730800"/>
+          <a:xfrm>
+            <a:off x="357257" y="4771665"/>
+            <a:ext cx="1692000" cy="1719569"/>
           </a:xfrm>
           <a:prstGeom prst="roundRect">
             <a:avLst/>

</xml_diff>